<commit_message>
Mood master and settings update
</commit_message>
<xml_diff>
--- a/Choice tasks.pptx
+++ b/Choice tasks.pptx
@@ -3396,7 +3396,7 @@
       </p:grpSpPr>
       <p:pic>
         <p:nvPicPr>
-          <p:cNvPr id="2" name="Picture 1"/>
+          <p:cNvPr id="4" name="Picture 3"/>
           <p:cNvPicPr>
             <a:picLocks noChangeAspect="1"/>
           </p:cNvPicPr>
@@ -3463,7 +3463,7 @@
       </p:grpSpPr>
       <p:pic>
         <p:nvPicPr>
-          <p:cNvPr id="3" name="Picture 2"/>
+          <p:cNvPr id="4" name="Picture 3"/>
           <p:cNvPicPr>
             <a:picLocks noChangeAspect="1"/>
           </p:cNvPicPr>
@@ -3755,11 +3755,7 @@
             </a:r>
             <a:r>
               <a:rPr lang="fr-FR" b="1" dirty="0" smtClean="0"/>
-              <a:t>effort </a:t>
-            </a:r>
-            <a:r>
-              <a:rPr lang="fr-FR" b="1" dirty="0" smtClean="0"/>
-              <a:t>physique</a:t>
+              <a:t>effort physique</a:t>
             </a:r>
             <a:endParaRPr lang="fr-FR" dirty="0"/>
           </a:p>

</xml_diff>